<commit_message>
Modification and description JazzUploadImage
</commit_message>
<xml_diff>
--- a/Descriptions/JazzUploadImage.pptx
+++ b/Descriptions/JazzUploadImage.pptx
@@ -245,7 +245,7 @@
           <a:p>
             <a:fld id="{9A42C61D-D669-4B9E-81E6-AA43D08BFCD1}" type="datetimeFigureOut">
               <a:rPr lang="de-CH" smtClean="0"/>
-              <a:t>05.04.2025</a:t>
+              <a:t>06.04.2025</a:t>
             </a:fld>
             <a:endParaRPr lang="de-CH"/>
           </a:p>
@@ -415,7 +415,7 @@
           <a:p>
             <a:fld id="{9A42C61D-D669-4B9E-81E6-AA43D08BFCD1}" type="datetimeFigureOut">
               <a:rPr lang="de-CH" smtClean="0"/>
-              <a:t>05.04.2025</a:t>
+              <a:t>06.04.2025</a:t>
             </a:fld>
             <a:endParaRPr lang="de-CH"/>
           </a:p>
@@ -595,7 +595,7 @@
           <a:p>
             <a:fld id="{9A42C61D-D669-4B9E-81E6-AA43D08BFCD1}" type="datetimeFigureOut">
               <a:rPr lang="de-CH" smtClean="0"/>
-              <a:t>05.04.2025</a:t>
+              <a:t>06.04.2025</a:t>
             </a:fld>
             <a:endParaRPr lang="de-CH"/>
           </a:p>
@@ -765,7 +765,7 @@
           <a:p>
             <a:fld id="{9A42C61D-D669-4B9E-81E6-AA43D08BFCD1}" type="datetimeFigureOut">
               <a:rPr lang="de-CH" smtClean="0"/>
-              <a:t>05.04.2025</a:t>
+              <a:t>06.04.2025</a:t>
             </a:fld>
             <a:endParaRPr lang="de-CH"/>
           </a:p>
@@ -1011,7 +1011,7 @@
           <a:p>
             <a:fld id="{9A42C61D-D669-4B9E-81E6-AA43D08BFCD1}" type="datetimeFigureOut">
               <a:rPr lang="de-CH" smtClean="0"/>
-              <a:t>05.04.2025</a:t>
+              <a:t>06.04.2025</a:t>
             </a:fld>
             <a:endParaRPr lang="de-CH"/>
           </a:p>
@@ -1243,7 +1243,7 @@
           <a:p>
             <a:fld id="{9A42C61D-D669-4B9E-81E6-AA43D08BFCD1}" type="datetimeFigureOut">
               <a:rPr lang="de-CH" smtClean="0"/>
-              <a:t>05.04.2025</a:t>
+              <a:t>06.04.2025</a:t>
             </a:fld>
             <a:endParaRPr lang="de-CH"/>
           </a:p>
@@ -1610,7 +1610,7 @@
           <a:p>
             <a:fld id="{9A42C61D-D669-4B9E-81E6-AA43D08BFCD1}" type="datetimeFigureOut">
               <a:rPr lang="de-CH" smtClean="0"/>
-              <a:t>05.04.2025</a:t>
+              <a:t>06.04.2025</a:t>
             </a:fld>
             <a:endParaRPr lang="de-CH"/>
           </a:p>
@@ -1728,7 +1728,7 @@
           <a:p>
             <a:fld id="{9A42C61D-D669-4B9E-81E6-AA43D08BFCD1}" type="datetimeFigureOut">
               <a:rPr lang="de-CH" smtClean="0"/>
-              <a:t>05.04.2025</a:t>
+              <a:t>06.04.2025</a:t>
             </a:fld>
             <a:endParaRPr lang="de-CH"/>
           </a:p>
@@ -1823,7 +1823,7 @@
           <a:p>
             <a:fld id="{9A42C61D-D669-4B9E-81E6-AA43D08BFCD1}" type="datetimeFigureOut">
               <a:rPr lang="de-CH" smtClean="0"/>
-              <a:t>05.04.2025</a:t>
+              <a:t>06.04.2025</a:t>
             </a:fld>
             <a:endParaRPr lang="de-CH"/>
           </a:p>
@@ -2100,7 +2100,7 @@
           <a:p>
             <a:fld id="{9A42C61D-D669-4B9E-81E6-AA43D08BFCD1}" type="datetimeFigureOut">
               <a:rPr lang="de-CH" smtClean="0"/>
-              <a:t>05.04.2025</a:t>
+              <a:t>06.04.2025</a:t>
             </a:fld>
             <a:endParaRPr lang="de-CH"/>
           </a:p>
@@ -2353,7 +2353,7 @@
           <a:p>
             <a:fld id="{9A42C61D-D669-4B9E-81E6-AA43D08BFCD1}" type="datetimeFigureOut">
               <a:rPr lang="de-CH" smtClean="0"/>
-              <a:t>05.04.2025</a:t>
+              <a:t>06.04.2025</a:t>
             </a:fld>
             <a:endParaRPr lang="de-CH"/>
           </a:p>
@@ -2566,7 +2566,7 @@
           <a:p>
             <a:fld id="{9A42C61D-D669-4B9E-81E6-AA43D08BFCD1}" type="datetimeFigureOut">
               <a:rPr lang="de-CH" smtClean="0"/>
-              <a:t>05.04.2025</a:t>
+              <a:t>06.04.2025</a:t>
             </a:fld>
             <a:endParaRPr lang="de-CH"/>
           </a:p>
@@ -3217,6 +3217,61 @@
             </a:endParaRPr>
           </a:p>
           <a:p>
+            <a:endParaRPr lang="en-US" sz="200" b="1" dirty="0">
+              <a:solidFill>
+                <a:schemeClr val="tx1"/>
+              </a:solidFill>
+              <a:latin typeface="Arial" panose="020B0604020202020204" pitchFamily="34" charset="0"/>
+              <a:cs typeface="Arial" panose="020B0604020202020204" pitchFamily="34" charset="0"/>
+            </a:endParaRPr>
+          </a:p>
+          <a:p>
+            <a:r>
+              <a:rPr lang="en-US" sz="1200" dirty="0">
+                <a:solidFill>
+                  <a:schemeClr val="tx1"/>
+                </a:solidFill>
+                <a:latin typeface="Arial" panose="020B0604020202020204" pitchFamily="34" charset="0"/>
+                <a:cs typeface="Arial" panose="020B0604020202020204" pitchFamily="34" charset="0"/>
+              </a:rPr>
+              <a:t>Member functions</a:t>
+            </a:r>
+          </a:p>
+          <a:p>
+            <a:r>
+              <a:rPr lang="en-US" sz="1000" b="1" dirty="0">
+                <a:solidFill>
+                  <a:schemeClr val="tx1"/>
+                </a:solidFill>
+                <a:latin typeface="Arial" panose="020B0604020202020204" pitchFamily="34" charset="0"/>
+                <a:cs typeface="Arial" panose="020B0604020202020204" pitchFamily="34" charset="0"/>
+              </a:rPr>
+              <a:t>Init</a:t>
+            </a:r>
+          </a:p>
+          <a:p>
+            <a:r>
+              <a:rPr lang="en-US" sz="1000" i="1" dirty="0">
+                <a:solidFill>
+                  <a:schemeClr val="tx1"/>
+                </a:solidFill>
+                <a:latin typeface="Arial" panose="020B0604020202020204" pitchFamily="34" charset="0"/>
+                <a:cs typeface="Arial" panose="020B0604020202020204" pitchFamily="34" charset="0"/>
+              </a:rPr>
+              <a:t>Initialization</a:t>
+            </a:r>
+          </a:p>
+          <a:p>
+            <a:r>
+              <a:rPr lang="en-US" sz="1000" b="1" dirty="0" err="1">
+                <a:solidFill>
+                  <a:schemeClr val="tx1"/>
+                </a:solidFill>
+                <a:latin typeface="Arial" panose="020B0604020202020204" pitchFamily="34" charset="0"/>
+                <a:cs typeface="Arial" panose="020B0604020202020204" pitchFamily="34" charset="0"/>
+              </a:rPr>
+              <a:t>setUploadFileUrl</a:t>
+            </a:r>
             <a:endParaRPr lang="en-US" sz="1000" b="1" dirty="0">
               <a:solidFill>
                 <a:schemeClr val="tx1"/>
@@ -3227,30 +3282,6 @@
           </a:p>
           <a:p>
             <a:r>
-              <a:rPr lang="en-US" sz="1200" dirty="0">
-                <a:solidFill>
-                  <a:schemeClr val="tx1"/>
-                </a:solidFill>
-                <a:latin typeface="Arial" panose="020B0604020202020204" pitchFamily="34" charset="0"/>
-                <a:cs typeface="Arial" panose="020B0604020202020204" pitchFamily="34" charset="0"/>
-              </a:rPr>
-              <a:t>Member functions</a:t>
-            </a:r>
-          </a:p>
-          <a:p>
-            <a:r>
-              <a:rPr lang="en-US" sz="1000" b="1" dirty="0">
-                <a:solidFill>
-                  <a:schemeClr val="tx1"/>
-                </a:solidFill>
-                <a:latin typeface="Arial" panose="020B0604020202020204" pitchFamily="34" charset="0"/>
-                <a:cs typeface="Arial" panose="020B0604020202020204" pitchFamily="34" charset="0"/>
-              </a:rPr>
-              <a:t>Init</a:t>
-            </a:r>
-          </a:p>
-          <a:p>
-            <a:r>
               <a:rPr lang="en-US" sz="1000" i="1" dirty="0">
                 <a:solidFill>
                   <a:schemeClr val="tx1"/>
@@ -3258,19 +3289,7 @@
                 <a:latin typeface="Arial" panose="020B0604020202020204" pitchFamily="34" charset="0"/>
                 <a:cs typeface="Arial" panose="020B0604020202020204" pitchFamily="34" charset="0"/>
               </a:rPr>
-              <a:t>Initialization</a:t>
-            </a:r>
-          </a:p>
-          <a:p>
-            <a:r>
-              <a:rPr lang="en-US" sz="1000" b="1" dirty="0" err="1">
-                <a:solidFill>
-                  <a:schemeClr val="tx1"/>
-                </a:solidFill>
-                <a:latin typeface="Arial" panose="020B0604020202020204" pitchFamily="34" charset="0"/>
-                <a:cs typeface="Arial" panose="020B0604020202020204" pitchFamily="34" charset="0"/>
-              </a:rPr>
-              <a:t>setUploadFileUrl</a:t>
+              <a:t> Set the full server file name (URL) for the uploaded image</a:t>
             </a:r>
             <a:endParaRPr lang="en-US" sz="1000" b="1" dirty="0">
               <a:solidFill>
@@ -3282,14 +3301,14 @@
           </a:p>
           <a:p>
             <a:r>
-              <a:rPr lang="en-US" sz="1000" i="1" dirty="0">
-                <a:solidFill>
-                  <a:schemeClr val="tx1"/>
-                </a:solidFill>
-                <a:latin typeface="Arial" panose="020B0604020202020204" pitchFamily="34" charset="0"/>
-                <a:cs typeface="Arial" panose="020B0604020202020204" pitchFamily="34" charset="0"/>
-              </a:rPr>
-              <a:t> Set the full server file name (URL) for the uploaded image</a:t>
+              <a:rPr lang="en-US" sz="1000" b="1" dirty="0" err="1">
+                <a:solidFill>
+                  <a:schemeClr val="tx1"/>
+                </a:solidFill>
+                <a:latin typeface="Arial" panose="020B0604020202020204" pitchFamily="34" charset="0"/>
+                <a:cs typeface="Arial" panose="020B0604020202020204" pitchFamily="34" charset="0"/>
+              </a:rPr>
+              <a:t>getImageFileFullName</a:t>
             </a:r>
             <a:endParaRPr lang="en-US" sz="1000" b="1" dirty="0">
               <a:solidFill>
@@ -3301,6 +3320,28 @@
           </a:p>
           <a:p>
             <a:r>
+              <a:rPr lang="en-US" sz="1000" b="1" dirty="0">
+                <a:solidFill>
+                  <a:schemeClr val="tx1"/>
+                </a:solidFill>
+                <a:latin typeface="Arial" panose="020B0604020202020204" pitchFamily="34" charset="0"/>
+                <a:cs typeface="Arial" panose="020B0604020202020204" pitchFamily="34" charset="0"/>
+              </a:rPr>
+              <a:t> </a:t>
+            </a:r>
+            <a:r>
+              <a:rPr lang="en-US" sz="1000" i="1" dirty="0">
+                <a:solidFill>
+                  <a:schemeClr val="tx1"/>
+                </a:solidFill>
+                <a:latin typeface="Arial" panose="020B0604020202020204" pitchFamily="34" charset="0"/>
+                <a:cs typeface="Arial" panose="020B0604020202020204" pitchFamily="34" charset="0"/>
+              </a:rPr>
+              <a:t>Get the full server file name (URL) to the uploaded image</a:t>
+            </a:r>
+          </a:p>
+          <a:p>
+            <a:r>
               <a:rPr lang="en-US" sz="1000" b="1" dirty="0" err="1">
                 <a:solidFill>
                   <a:schemeClr val="tx1"/>
@@ -3308,7 +3349,7 @@
                 <a:latin typeface="Arial" panose="020B0604020202020204" pitchFamily="34" charset="0"/>
                 <a:cs typeface="Arial" panose="020B0604020202020204" pitchFamily="34" charset="0"/>
               </a:rPr>
-              <a:t>getImageFileFullName</a:t>
+              <a:t>addEventListenerForInputFileElement</a:t>
             </a:r>
             <a:endParaRPr lang="en-US" sz="1000" b="1" dirty="0">
               <a:solidFill>
@@ -3320,16 +3361,6 @@
           </a:p>
           <a:p>
             <a:r>
-              <a:rPr lang="en-US" sz="1000" b="1" dirty="0">
-                <a:solidFill>
-                  <a:schemeClr val="tx1"/>
-                </a:solidFill>
-                <a:latin typeface="Arial" panose="020B0604020202020204" pitchFamily="34" charset="0"/>
-                <a:cs typeface="Arial" panose="020B0604020202020204" pitchFamily="34" charset="0"/>
-              </a:rPr>
-              <a:t> </a:t>
-            </a:r>
-            <a:r>
               <a:rPr lang="en-US" sz="1000" i="1" dirty="0">
                 <a:solidFill>
                   <a:schemeClr val="tx1"/>
@@ -3337,19 +3368,7 @@
                 <a:latin typeface="Arial" panose="020B0604020202020204" pitchFamily="34" charset="0"/>
                 <a:cs typeface="Arial" panose="020B0604020202020204" pitchFamily="34" charset="0"/>
               </a:rPr>
-              <a:t>Get the full server file name (URL) to the uploaded image</a:t>
-            </a:r>
-          </a:p>
-          <a:p>
-            <a:r>
-              <a:rPr lang="en-US" sz="1000" b="1" dirty="0" err="1">
-                <a:solidFill>
-                  <a:schemeClr val="tx1"/>
-                </a:solidFill>
-                <a:latin typeface="Arial" panose="020B0604020202020204" pitchFamily="34" charset="0"/>
-                <a:cs typeface="Arial" panose="020B0604020202020204" pitchFamily="34" charset="0"/>
-              </a:rPr>
-              <a:t>addEventListenerForInputFileElement</a:t>
+              <a:t>Adds an event listener for the input file element</a:t>
             </a:r>
             <a:endParaRPr lang="en-US" sz="1000" b="1" dirty="0">
               <a:solidFill>
@@ -3361,14 +3380,14 @@
           </a:p>
           <a:p>
             <a:r>
-              <a:rPr lang="en-US" sz="1000" i="1" dirty="0">
-                <a:solidFill>
-                  <a:schemeClr val="tx1"/>
-                </a:solidFill>
-                <a:latin typeface="Arial" panose="020B0604020202020204" pitchFamily="34" charset="0"/>
-                <a:cs typeface="Arial" panose="020B0604020202020204" pitchFamily="34" charset="0"/>
-              </a:rPr>
-              <a:t>Adds an event listener for the input file element</a:t>
+              <a:rPr lang="en-US" sz="1000" b="1" dirty="0" err="1">
+                <a:solidFill>
+                  <a:schemeClr val="tx1"/>
+                </a:solidFill>
+                <a:latin typeface="Arial" panose="020B0604020202020204" pitchFamily="34" charset="0"/>
+                <a:cs typeface="Arial" panose="020B0604020202020204" pitchFamily="34" charset="0"/>
+              </a:rPr>
+              <a:t>addEventListenerForUploadImageElement</a:t>
             </a:r>
             <a:endParaRPr lang="en-US" sz="1000" b="1" dirty="0">
               <a:solidFill>
@@ -3380,6 +3399,38 @@
           </a:p>
           <a:p>
             <a:r>
+              <a:rPr lang="en-US" sz="1000" i="1" dirty="0">
+                <a:solidFill>
+                  <a:schemeClr val="tx1"/>
+                </a:solidFill>
+                <a:latin typeface="Arial" panose="020B0604020202020204" pitchFamily="34" charset="0"/>
+                <a:cs typeface="Arial" panose="020B0604020202020204" pitchFamily="34" charset="0"/>
+              </a:rPr>
+              <a:t>Adds an event handler to the &lt;</a:t>
+            </a:r>
+            <a:r>
+              <a:rPr lang="en-US" sz="1000" i="1" dirty="0" err="1">
+                <a:solidFill>
+                  <a:schemeClr val="tx1"/>
+                </a:solidFill>
+                <a:latin typeface="Arial" panose="020B0604020202020204" pitchFamily="34" charset="0"/>
+                <a:cs typeface="Arial" panose="020B0604020202020204" pitchFamily="34" charset="0"/>
+              </a:rPr>
+              <a:t>img</a:t>
+            </a:r>
+            <a:r>
+              <a:rPr lang="en-US" sz="1000" i="1" dirty="0">
+                <a:solidFill>
+                  <a:schemeClr val="tx1"/>
+                </a:solidFill>
+                <a:latin typeface="Arial" panose="020B0604020202020204" pitchFamily="34" charset="0"/>
+                <a:cs typeface="Arial" panose="020B0604020202020204" pitchFamily="34" charset="0"/>
+              </a:rPr>
+              <a:t>&gt; element </a:t>
+            </a:r>
+          </a:p>
+          <a:p>
+            <a:r>
               <a:rPr lang="en-US" sz="1000" b="1" dirty="0" err="1">
                 <a:solidFill>
                   <a:schemeClr val="tx1"/>
@@ -3387,7 +3438,7 @@
                 <a:latin typeface="Arial" panose="020B0604020202020204" pitchFamily="34" charset="0"/>
                 <a:cs typeface="Arial" panose="020B0604020202020204" pitchFamily="34" charset="0"/>
               </a:rPr>
-              <a:t>addEventListenerForUploadImageElement</a:t>
+              <a:t>imageIsLoaded</a:t>
             </a:r>
             <a:endParaRPr lang="en-US" sz="1000" b="1" dirty="0">
               <a:solidFill>
@@ -3406,39 +3457,7 @@
                 <a:latin typeface="Arial" panose="020B0604020202020204" pitchFamily="34" charset="0"/>
                 <a:cs typeface="Arial" panose="020B0604020202020204" pitchFamily="34" charset="0"/>
               </a:rPr>
-              <a:t>Adds an event handler to the &lt;</a:t>
-            </a:r>
-            <a:r>
-              <a:rPr lang="en-US" sz="1000" i="1" dirty="0" err="1">
-                <a:solidFill>
-                  <a:schemeClr val="tx1"/>
-                </a:solidFill>
-                <a:latin typeface="Arial" panose="020B0604020202020204" pitchFamily="34" charset="0"/>
-                <a:cs typeface="Arial" panose="020B0604020202020204" pitchFamily="34" charset="0"/>
-              </a:rPr>
-              <a:t>img</a:t>
-            </a:r>
-            <a:r>
-              <a:rPr lang="en-US" sz="1000" i="1" dirty="0">
-                <a:solidFill>
-                  <a:schemeClr val="tx1"/>
-                </a:solidFill>
-                <a:latin typeface="Arial" panose="020B0604020202020204" pitchFamily="34" charset="0"/>
-                <a:cs typeface="Arial" panose="020B0604020202020204" pitchFamily="34" charset="0"/>
-              </a:rPr>
-              <a:t>&gt; element </a:t>
-            </a:r>
-          </a:p>
-          <a:p>
-            <a:r>
-              <a:rPr lang="en-US" sz="1000" b="1" dirty="0" err="1">
-                <a:solidFill>
-                  <a:schemeClr val="tx1"/>
-                </a:solidFill>
-                <a:latin typeface="Arial" panose="020B0604020202020204" pitchFamily="34" charset="0"/>
-                <a:cs typeface="Arial" panose="020B0604020202020204" pitchFamily="34" charset="0"/>
-              </a:rPr>
-              <a:t>imageIsLoaded</a:t>
+              <a:t>Event: Image is loaded.</a:t>
             </a:r>
             <a:endParaRPr lang="en-US" sz="1000" b="1" dirty="0">
               <a:solidFill>
@@ -3450,14 +3469,14 @@
           </a:p>
           <a:p>
             <a:r>
-              <a:rPr lang="en-US" sz="1000" i="1" dirty="0">
-                <a:solidFill>
-                  <a:schemeClr val="tx1"/>
-                </a:solidFill>
-                <a:latin typeface="Arial" panose="020B0604020202020204" pitchFamily="34" charset="0"/>
-                <a:cs typeface="Arial" panose="020B0604020202020204" pitchFamily="34" charset="0"/>
-              </a:rPr>
-              <a:t>Event: Image is loaded.</a:t>
+              <a:rPr lang="en-US" sz="1000" b="1" dirty="0" err="1">
+                <a:solidFill>
+                  <a:schemeClr val="tx1"/>
+                </a:solidFill>
+                <a:latin typeface="Arial" panose="020B0604020202020204" pitchFamily="34" charset="0"/>
+                <a:cs typeface="Arial" panose="020B0604020202020204" pitchFamily="34" charset="0"/>
+              </a:rPr>
+              <a:t>userSelectedFiles</a:t>
             </a:r>
             <a:endParaRPr lang="en-US" sz="1000" b="1" dirty="0">
               <a:solidFill>
@@ -3469,14 +3488,14 @@
           </a:p>
           <a:p>
             <a:r>
-              <a:rPr lang="en-US" sz="1000" b="1" dirty="0" err="1">
-                <a:solidFill>
-                  <a:schemeClr val="tx1"/>
-                </a:solidFill>
-                <a:latin typeface="Arial" panose="020B0604020202020204" pitchFamily="34" charset="0"/>
-                <a:cs typeface="Arial" panose="020B0604020202020204" pitchFamily="34" charset="0"/>
-              </a:rPr>
-              <a:t>userSelectedFiles</a:t>
+              <a:rPr lang="en-US" sz="1000" i="1" dirty="0">
+                <a:solidFill>
+                  <a:schemeClr val="tx1"/>
+                </a:solidFill>
+                <a:latin typeface="Arial" panose="020B0604020202020204" pitchFamily="34" charset="0"/>
+                <a:cs typeface="Arial" panose="020B0604020202020204" pitchFamily="34" charset="0"/>
+              </a:rPr>
+              <a:t>Event function when the user selected files</a:t>
             </a:r>
             <a:endParaRPr lang="en-US" sz="1000" b="1" dirty="0">
               <a:solidFill>
@@ -3488,14 +3507,14 @@
           </a:p>
           <a:p>
             <a:r>
-              <a:rPr lang="en-US" sz="1000" i="1" dirty="0">
-                <a:solidFill>
-                  <a:schemeClr val="tx1"/>
-                </a:solidFill>
-                <a:latin typeface="Arial" panose="020B0604020202020204" pitchFamily="34" charset="0"/>
-                <a:cs typeface="Arial" panose="020B0604020202020204" pitchFamily="34" charset="0"/>
-              </a:rPr>
-              <a:t>Event function when the user selected files</a:t>
+              <a:rPr lang="en-US" sz="1000" b="1" dirty="0" err="1">
+                <a:solidFill>
+                  <a:schemeClr val="tx1"/>
+                </a:solidFill>
+                <a:latin typeface="Arial" panose="020B0604020202020204" pitchFamily="34" charset="0"/>
+                <a:cs typeface="Arial" panose="020B0604020202020204" pitchFamily="34" charset="0"/>
+              </a:rPr>
+              <a:t>resetDefaultImage</a:t>
             </a:r>
             <a:endParaRPr lang="en-US" sz="1000" b="1" dirty="0">
               <a:solidFill>
@@ -3507,14 +3526,14 @@
           </a:p>
           <a:p>
             <a:r>
-              <a:rPr lang="en-US" sz="1000" b="1" dirty="0" err="1">
-                <a:solidFill>
-                  <a:schemeClr val="tx1"/>
-                </a:solidFill>
-                <a:latin typeface="Arial" panose="020B0604020202020204" pitchFamily="34" charset="0"/>
-                <a:cs typeface="Arial" panose="020B0604020202020204" pitchFamily="34" charset="0"/>
-              </a:rPr>
-              <a:t>resetDefaultImage</a:t>
+              <a:rPr lang="en-US" sz="1000" i="1" dirty="0">
+                <a:solidFill>
+                  <a:schemeClr val="tx1"/>
+                </a:solidFill>
+                <a:latin typeface="Arial" panose="020B0604020202020204" pitchFamily="34" charset="0"/>
+                <a:cs typeface="Arial" panose="020B0604020202020204" pitchFamily="34" charset="0"/>
+              </a:rPr>
+              <a:t>Resets the default image</a:t>
             </a:r>
             <a:endParaRPr lang="en-US" sz="1000" b="1" dirty="0">
               <a:solidFill>
@@ -3526,14 +3545,14 @@
           </a:p>
           <a:p>
             <a:r>
-              <a:rPr lang="en-US" sz="1000" i="1" dirty="0">
-                <a:solidFill>
-                  <a:schemeClr val="tx1"/>
-                </a:solidFill>
-                <a:latin typeface="Arial" panose="020B0604020202020204" pitchFamily="34" charset="0"/>
-                <a:cs typeface="Arial" panose="020B0604020202020204" pitchFamily="34" charset="0"/>
-              </a:rPr>
-              <a:t>Resets the default image</a:t>
+              <a:rPr lang="en-US" sz="1000" b="1" dirty="0" err="1">
+                <a:solidFill>
+                  <a:schemeClr val="tx1"/>
+                </a:solidFill>
+                <a:latin typeface="Arial" panose="020B0604020202020204" pitchFamily="34" charset="0"/>
+                <a:cs typeface="Arial" panose="020B0604020202020204" pitchFamily="34" charset="0"/>
+              </a:rPr>
+              <a:t>displayUploadedImage</a:t>
             </a:r>
             <a:endParaRPr lang="en-US" sz="1000" b="1" dirty="0">
               <a:solidFill>
@@ -3545,6 +3564,18 @@
           </a:p>
           <a:p>
             <a:r>
+              <a:rPr lang="en-US" sz="1000" i="1" dirty="0">
+                <a:solidFill>
+                  <a:schemeClr val="tx1"/>
+                </a:solidFill>
+                <a:latin typeface="Arial" panose="020B0604020202020204" pitchFamily="34" charset="0"/>
+                <a:cs typeface="Arial" panose="020B0604020202020204" pitchFamily="34" charset="0"/>
+              </a:rPr>
+              <a:t>Display an uploaded image</a:t>
+            </a:r>
+          </a:p>
+          <a:p>
+            <a:r>
               <a:rPr lang="en-US" sz="1000" b="1" dirty="0" err="1">
                 <a:solidFill>
                   <a:schemeClr val="tx1"/>
@@ -3552,7 +3583,7 @@
                 <a:latin typeface="Arial" panose="020B0604020202020204" pitchFamily="34" charset="0"/>
                 <a:cs typeface="Arial" panose="020B0604020202020204" pitchFamily="34" charset="0"/>
               </a:rPr>
-              <a:t>displayUploadedImage</a:t>
+              <a:t>getConvertedImageFile</a:t>
             </a:r>
             <a:endParaRPr lang="en-US" sz="1000" b="1" dirty="0">
               <a:solidFill>
@@ -3571,7 +3602,7 @@
                 <a:latin typeface="Arial" panose="020B0604020202020204" pitchFamily="34" charset="0"/>
                 <a:cs typeface="Arial" panose="020B0604020202020204" pitchFamily="34" charset="0"/>
               </a:rPr>
-              <a:t>Display an uploaded image</a:t>
+              <a:t>Get image file that has been converted to type jpeg</a:t>
             </a:r>
           </a:p>
           <a:p>
@@ -3583,7 +3614,7 @@
                 <a:latin typeface="Arial" panose="020B0604020202020204" pitchFamily="34" charset="0"/>
                 <a:cs typeface="Arial" panose="020B0604020202020204" pitchFamily="34" charset="0"/>
               </a:rPr>
-              <a:t>getConvertedImageFile</a:t>
+              <a:t>getCompressedImageFile</a:t>
             </a:r>
             <a:endParaRPr lang="en-US" sz="1000" b="1" dirty="0">
               <a:solidFill>
@@ -3602,7 +3633,7 @@
                 <a:latin typeface="Arial" panose="020B0604020202020204" pitchFamily="34" charset="0"/>
                 <a:cs typeface="Arial" panose="020B0604020202020204" pitchFamily="34" charset="0"/>
               </a:rPr>
-              <a:t>Get image file that has been converted to type jpeg</a:t>
+              <a:t>Get a compressed image if bigger as the input maximum size in Megabyte</a:t>
             </a:r>
           </a:p>
           <a:p>
@@ -3614,7 +3645,7 @@
                 <a:latin typeface="Arial" panose="020B0604020202020204" pitchFamily="34" charset="0"/>
                 <a:cs typeface="Arial" panose="020B0604020202020204" pitchFamily="34" charset="0"/>
               </a:rPr>
-              <a:t>getCompressedImageFile</a:t>
+              <a:t>fileIsOfTypeImage</a:t>
             </a:r>
             <a:endParaRPr lang="en-US" sz="1000" b="1" dirty="0">
               <a:solidFill>
@@ -3633,7 +3664,7 @@
                 <a:latin typeface="Arial" panose="020B0604020202020204" pitchFamily="34" charset="0"/>
                 <a:cs typeface="Arial" panose="020B0604020202020204" pitchFamily="34" charset="0"/>
               </a:rPr>
-              <a:t>Get a compressed image if bigger as the input maximum size in Megabyte</a:t>
+              <a:t>Returns true if the input file is of type image</a:t>
             </a:r>
           </a:p>
           <a:p>
@@ -3645,7 +3676,61 @@
                 <a:latin typeface="Arial" panose="020B0604020202020204" pitchFamily="34" charset="0"/>
                 <a:cs typeface="Arial" panose="020B0604020202020204" pitchFamily="34" charset="0"/>
               </a:rPr>
-              <a:t>fileIsOfTypeImage</a:t>
+              <a:t>getFileTypeImage</a:t>
+            </a:r>
+            <a:r>
+              <a:rPr lang="en-US" sz="1000" b="1" dirty="0">
+                <a:solidFill>
+                  <a:schemeClr val="tx1"/>
+                </a:solidFill>
+                <a:latin typeface="Arial" panose="020B0604020202020204" pitchFamily="34" charset="0"/>
+                <a:cs typeface="Arial" panose="020B0604020202020204" pitchFamily="34" charset="0"/>
+              </a:rPr>
+              <a:t>(</a:t>
+            </a:r>
+            <a:r>
+              <a:rPr lang="en-US" sz="1000" b="1" dirty="0" err="1">
+                <a:solidFill>
+                  <a:schemeClr val="tx1"/>
+                </a:solidFill>
+                <a:latin typeface="Arial" panose="020B0604020202020204" pitchFamily="34" charset="0"/>
+                <a:cs typeface="Arial" panose="020B0604020202020204" pitchFamily="34" charset="0"/>
+              </a:rPr>
+              <a:t>i_file</a:t>
+            </a:r>
+            <a:r>
+              <a:rPr lang="en-US" sz="1000" b="1" dirty="0">
+                <a:solidFill>
+                  <a:schemeClr val="tx1"/>
+                </a:solidFill>
+                <a:latin typeface="Arial" panose="020B0604020202020204" pitchFamily="34" charset="0"/>
+                <a:cs typeface="Arial" panose="020B0604020202020204" pitchFamily="34" charset="0"/>
+              </a:rPr>
+              <a:t>)</a:t>
+            </a:r>
+          </a:p>
+          <a:p>
+            <a:r>
+              <a:rPr lang="en-US" sz="1000" i="1" dirty="0">
+                <a:solidFill>
+                  <a:schemeClr val="tx1"/>
+                </a:solidFill>
+                <a:latin typeface="Arial" panose="020B0604020202020204" pitchFamily="34" charset="0"/>
+                <a:cs typeface="Arial" panose="020B0604020202020204" pitchFamily="34" charset="0"/>
+              </a:rPr>
+              <a:t>Returns the Image file type of the input File</a:t>
+            </a:r>
+          </a:p>
+          <a:p>
+            <a:r>
+              <a:rPr lang="en-US" sz="1000" b="1" dirty="0" err="1">
+                <a:solidFill>
+                  <a:schemeClr val="tx1"/>
+                </a:solidFill>
+                <a:latin typeface="Arial" panose="020B0604020202020204" pitchFamily="34" charset="0"/>
+                <a:cs typeface="Arial" panose="020B0604020202020204" pitchFamily="34" charset="0"/>
+              </a:rPr>
+              <a:t>getHtml</a:t>
             </a:r>
             <a:endParaRPr lang="en-US" sz="1000" b="1" dirty="0">
               <a:solidFill>
@@ -3664,8 +3749,25 @@
                 <a:latin typeface="Arial" panose="020B0604020202020204" pitchFamily="34" charset="0"/>
                 <a:cs typeface="Arial" panose="020B0604020202020204" pitchFamily="34" charset="0"/>
               </a:rPr>
-              <a:t>Returns true if the input file is of type image</a:t>
-            </a:r>
+              <a:t>Get the HTML string defining the content of </a:t>
+            </a:r>
+            <a:r>
+              <a:rPr lang="en-US" sz="1000" i="1" dirty="0" err="1">
+                <a:solidFill>
+                  <a:schemeClr val="tx1"/>
+                </a:solidFill>
+                <a:latin typeface="Arial" panose="020B0604020202020204" pitchFamily="34" charset="0"/>
+                <a:cs typeface="Arial" panose="020B0604020202020204" pitchFamily="34" charset="0"/>
+              </a:rPr>
+              <a:t>i_id_div_container</a:t>
+            </a:r>
+            <a:endParaRPr lang="en-US" sz="1000" i="1" dirty="0">
+              <a:solidFill>
+                <a:schemeClr val="tx1"/>
+              </a:solidFill>
+              <a:latin typeface="Arial" panose="020B0604020202020204" pitchFamily="34" charset="0"/>
+              <a:cs typeface="Arial" panose="020B0604020202020204" pitchFamily="34" charset="0"/>
+            </a:endParaRPr>
           </a:p>
           <a:p>
             <a:r>
@@ -3676,61 +3778,7 @@
                 <a:latin typeface="Arial" panose="020B0604020202020204" pitchFamily="34" charset="0"/>
                 <a:cs typeface="Arial" panose="020B0604020202020204" pitchFamily="34" charset="0"/>
               </a:rPr>
-              <a:t>getFileTypeImage</a:t>
-            </a:r>
-            <a:r>
-              <a:rPr lang="en-US" sz="1000" b="1" dirty="0">
-                <a:solidFill>
-                  <a:schemeClr val="tx1"/>
-                </a:solidFill>
-                <a:latin typeface="Arial" panose="020B0604020202020204" pitchFamily="34" charset="0"/>
-                <a:cs typeface="Arial" panose="020B0604020202020204" pitchFamily="34" charset="0"/>
-              </a:rPr>
-              <a:t>(</a:t>
-            </a:r>
-            <a:r>
-              <a:rPr lang="en-US" sz="1000" b="1" dirty="0" err="1">
-                <a:solidFill>
-                  <a:schemeClr val="tx1"/>
-                </a:solidFill>
-                <a:latin typeface="Arial" panose="020B0604020202020204" pitchFamily="34" charset="0"/>
-                <a:cs typeface="Arial" panose="020B0604020202020204" pitchFamily="34" charset="0"/>
-              </a:rPr>
-              <a:t>i_file</a:t>
-            </a:r>
-            <a:r>
-              <a:rPr lang="en-US" sz="1000" b="1" dirty="0">
-                <a:solidFill>
-                  <a:schemeClr val="tx1"/>
-                </a:solidFill>
-                <a:latin typeface="Arial" panose="020B0604020202020204" pitchFamily="34" charset="0"/>
-                <a:cs typeface="Arial" panose="020B0604020202020204" pitchFamily="34" charset="0"/>
-              </a:rPr>
-              <a:t>)</a:t>
-            </a:r>
-          </a:p>
-          <a:p>
-            <a:r>
-              <a:rPr lang="en-US" sz="1000" i="1" dirty="0">
-                <a:solidFill>
-                  <a:schemeClr val="tx1"/>
-                </a:solidFill>
-                <a:latin typeface="Arial" panose="020B0604020202020204" pitchFamily="34" charset="0"/>
-                <a:cs typeface="Arial" panose="020B0604020202020204" pitchFamily="34" charset="0"/>
-              </a:rPr>
-              <a:t>Returns the Image file type of the input File</a:t>
-            </a:r>
-          </a:p>
-          <a:p>
-            <a:r>
-              <a:rPr lang="en-US" sz="1000" b="1" dirty="0" err="1">
-                <a:solidFill>
-                  <a:schemeClr val="tx1"/>
-                </a:solidFill>
-                <a:latin typeface="Arial" panose="020B0604020202020204" pitchFamily="34" charset="0"/>
-                <a:cs typeface="Arial" panose="020B0604020202020204" pitchFamily="34" charset="0"/>
-              </a:rPr>
-              <a:t>getHtml</a:t>
+              <a:t>changeDefaultImageFile</a:t>
             </a:r>
             <a:endParaRPr lang="en-US" sz="1000" b="1" dirty="0">
               <a:solidFill>
@@ -3749,25 +3797,8 @@
                 <a:latin typeface="Arial" panose="020B0604020202020204" pitchFamily="34" charset="0"/>
                 <a:cs typeface="Arial" panose="020B0604020202020204" pitchFamily="34" charset="0"/>
               </a:rPr>
-              <a:t>Get the HTML string defining the content of </a:t>
-            </a:r>
-            <a:r>
-              <a:rPr lang="en-US" sz="1000" i="1" dirty="0" err="1">
-                <a:solidFill>
-                  <a:schemeClr val="tx1"/>
-                </a:solidFill>
-                <a:latin typeface="Arial" panose="020B0604020202020204" pitchFamily="34" charset="0"/>
-                <a:cs typeface="Arial" panose="020B0604020202020204" pitchFamily="34" charset="0"/>
-              </a:rPr>
-              <a:t>i_id_div_container</a:t>
-            </a:r>
-            <a:endParaRPr lang="en-US" sz="1000" i="1" dirty="0">
-              <a:solidFill>
-                <a:schemeClr val="tx1"/>
-              </a:solidFill>
-              <a:latin typeface="Arial" panose="020B0604020202020204" pitchFamily="34" charset="0"/>
-              <a:cs typeface="Arial" panose="020B0604020202020204" pitchFamily="34" charset="0"/>
-            </a:endParaRPr>
+              <a:t>Replaces the default image</a:t>
+            </a:r>
           </a:p>
         </p:txBody>
       </p:sp>
@@ -3785,7 +3816,7 @@
         </p:nvSpPr>
         <p:spPr>
           <a:xfrm>
-            <a:off x="6096001" y="319939"/>
+            <a:off x="5825835" y="319939"/>
             <a:ext cx="4478369" cy="570469"/>
           </a:xfrm>
           <a:prstGeom prst="rect">
@@ -3963,7 +3994,7 @@
         </p:nvSpPr>
         <p:spPr>
           <a:xfrm>
-            <a:off x="6096000" y="890406"/>
+            <a:off x="5825834" y="890406"/>
             <a:ext cx="4478372" cy="4793421"/>
           </a:xfrm>
           <a:prstGeom prst="rect">

</xml_diff>